<commit_message>
adding platform image drafts
</commit_message>
<xml_diff>
--- a/semic-2020/img/platforms.pptx
+++ b/semic-2020/img/platforms.pptx
@@ -8,6 +8,7 @@
     <p:sldId id="256" r:id="rId2"/>
     <p:sldId id="257" r:id="rId3"/>
     <p:sldId id="258" r:id="rId4"/>
+    <p:sldId id="259" r:id="rId5"/>
   </p:sldIdLst>
   <p:sldSz cx="12192000" cy="6858000"/>
   <p:notesSz cx="6858000" cy="9144000"/>
@@ -3986,7 +3987,7 @@
         <p:spPr>
           <a:xfrm flipV="1">
             <a:off x="2557462" y="4254103"/>
-            <a:ext cx="1281115" cy="592931"/>
+            <a:ext cx="1298101" cy="592931"/>
           </a:xfrm>
           <a:prstGeom prst="straightConnector1">
             <a:avLst/>
@@ -5441,10 +5442,10 @@
       </p:cxnSp>
       <p:sp>
         <p:nvSpPr>
-          <p:cNvPr id="26" name="Rectangle 25">
-            <a:extLst>
-              <a:ext uri="{FF2B5EF4-FFF2-40B4-BE49-F238E27FC236}">
-                <a16:creationId xmlns:a16="http://schemas.microsoft.com/office/drawing/2014/main" id="{6798C27B-1DB7-CC4C-AD61-F26CF00DC7CE}"/>
+          <p:cNvPr id="28" name="Rectangle 27">
+            <a:extLst>
+              <a:ext uri="{FF2B5EF4-FFF2-40B4-BE49-F238E27FC236}">
+                <a16:creationId xmlns:a16="http://schemas.microsoft.com/office/drawing/2014/main" id="{35D55A4B-E4E0-0144-ABEA-5BAA5E3D989F}"/>
               </a:ext>
             </a:extLst>
           </p:cNvPr>
@@ -5453,7 +5454,7 @@
         </p:nvSpPr>
         <p:spPr>
           <a:xfrm>
-            <a:off x="5291430" y="4043610"/>
+            <a:off x="6694450" y="3263153"/>
             <a:ext cx="1164432" cy="528637"/>
           </a:xfrm>
           <a:prstGeom prst="rect">
@@ -5483,56 +5484,6 @@
             <a:pPr algn="ctr"/>
             <a:r>
               <a:rPr lang="en-US" sz="1400" dirty="0"/>
-              <a:t>Data</a:t>
-            </a:r>
-            <a:endParaRPr lang="en-US" dirty="0"/>
-          </a:p>
-        </p:txBody>
-      </p:sp>
-      <p:sp>
-        <p:nvSpPr>
-          <p:cNvPr id="28" name="Rectangle 27">
-            <a:extLst>
-              <a:ext uri="{FF2B5EF4-FFF2-40B4-BE49-F238E27FC236}">
-                <a16:creationId xmlns:a16="http://schemas.microsoft.com/office/drawing/2014/main" id="{35D55A4B-E4E0-0144-ABEA-5BAA5E3D989F}"/>
-              </a:ext>
-            </a:extLst>
-          </p:cNvPr>
-          <p:cNvSpPr/>
-          <p:nvPr/>
-        </p:nvSpPr>
-        <p:spPr>
-          <a:xfrm>
-            <a:off x="6694450" y="3263153"/>
-            <a:ext cx="1164432" cy="528637"/>
-          </a:xfrm>
-          <a:prstGeom prst="rect">
-            <a:avLst/>
-          </a:prstGeom>
-        </p:spPr>
-        <p:style>
-          <a:lnRef idx="2">
-            <a:schemeClr val="accent1">
-              <a:shade val="50000"/>
-            </a:schemeClr>
-          </a:lnRef>
-          <a:fillRef idx="1">
-            <a:schemeClr val="accent1"/>
-          </a:fillRef>
-          <a:effectRef idx="0">
-            <a:schemeClr val="accent1"/>
-          </a:effectRef>
-          <a:fontRef idx="minor">
-            <a:schemeClr val="lt1"/>
-          </a:fontRef>
-        </p:style>
-        <p:txBody>
-          <a:bodyPr rtlCol="0" anchor="ctr"/>
-          <a:lstStyle/>
-          <a:p>
-            <a:pPr algn="ctr"/>
-            <a:r>
-              <a:rPr lang="en-US" sz="1400" dirty="0"/>
               <a:t>Services</a:t>
             </a:r>
             <a:endParaRPr lang="en-US" dirty="0"/>
@@ -5555,8 +5506,8 @@
         </p:nvCxnSpPr>
         <p:spPr>
           <a:xfrm flipH="1" flipV="1">
-            <a:off x="4871066" y="3493535"/>
-            <a:ext cx="420363" cy="812316"/>
+            <a:off x="4871067" y="3493535"/>
+            <a:ext cx="420362" cy="714380"/>
           </a:xfrm>
           <a:prstGeom prst="straightConnector1">
             <a:avLst/>
@@ -5616,6 +5567,216 @@
           </a:prstGeom>
         </p:spPr>
       </p:pic>
+      <p:cxnSp>
+        <p:nvCxnSpPr>
+          <p:cNvPr id="49" name="Straight Arrow Connector 48">
+            <a:extLst>
+              <a:ext uri="{FF2B5EF4-FFF2-40B4-BE49-F238E27FC236}">
+                <a16:creationId xmlns:a16="http://schemas.microsoft.com/office/drawing/2014/main" id="{EEF705F1-4E1F-8441-AD02-6F437B389ED7}"/>
+              </a:ext>
+            </a:extLst>
+          </p:cNvPr>
+          <p:cNvCxnSpPr>
+            <a:cxnSpLocks/>
+            <a:stCxn id="28" idx="2"/>
+            <a:endCxn id="26" idx="3"/>
+          </p:cNvCxnSpPr>
+          <p:nvPr/>
+        </p:nvCxnSpPr>
+        <p:spPr>
+          <a:xfrm flipH="1">
+            <a:off x="6455862" y="3791790"/>
+            <a:ext cx="820804" cy="516139"/>
+          </a:xfrm>
+          <a:prstGeom prst="straightConnector1">
+            <a:avLst/>
+          </a:prstGeom>
+          <a:ln w="38100">
+            <a:tailEnd type="triangle"/>
+          </a:ln>
+        </p:spPr>
+        <p:style>
+          <a:lnRef idx="1">
+            <a:schemeClr val="accent1"/>
+          </a:lnRef>
+          <a:fillRef idx="0">
+            <a:schemeClr val="accent1"/>
+          </a:fillRef>
+          <a:effectRef idx="0">
+            <a:schemeClr val="accent1"/>
+          </a:effectRef>
+          <a:fontRef idx="minor">
+            <a:schemeClr val="tx1"/>
+          </a:fontRef>
+        </p:style>
+      </p:cxnSp>
+      <p:cxnSp>
+        <p:nvCxnSpPr>
+          <p:cNvPr id="62" name="Straight Connector 61">
+            <a:extLst>
+              <a:ext uri="{FF2B5EF4-FFF2-40B4-BE49-F238E27FC236}">
+                <a16:creationId xmlns:a16="http://schemas.microsoft.com/office/drawing/2014/main" id="{FBD94430-6F08-5E40-95E5-B1FDB10C40D9}"/>
+              </a:ext>
+            </a:extLst>
+          </p:cNvPr>
+          <p:cNvCxnSpPr>
+            <a:cxnSpLocks/>
+          </p:cNvCxnSpPr>
+          <p:nvPr/>
+        </p:nvCxnSpPr>
+        <p:spPr>
+          <a:xfrm>
+            <a:off x="5872899" y="999241"/>
+            <a:ext cx="0" cy="5222450"/>
+          </a:xfrm>
+          <a:prstGeom prst="line">
+            <a:avLst/>
+          </a:prstGeom>
+          <a:ln w="231775">
+            <a:solidFill>
+              <a:schemeClr val="bg2">
+                <a:lumMod val="90000"/>
+                <a:alpha val="49000"/>
+              </a:schemeClr>
+            </a:solidFill>
+            <a:prstDash val="solid"/>
+          </a:ln>
+        </p:spPr>
+        <p:style>
+          <a:lnRef idx="1">
+            <a:schemeClr val="accent1"/>
+          </a:lnRef>
+          <a:fillRef idx="0">
+            <a:schemeClr val="accent1"/>
+          </a:fillRef>
+          <a:effectRef idx="0">
+            <a:schemeClr val="accent1"/>
+          </a:effectRef>
+          <a:fontRef idx="minor">
+            <a:schemeClr val="tx1"/>
+          </a:fontRef>
+        </p:style>
+      </p:cxnSp>
+      <p:sp>
+        <p:nvSpPr>
+          <p:cNvPr id="64" name="TextBox 63">
+            <a:extLst>
+              <a:ext uri="{FF2B5EF4-FFF2-40B4-BE49-F238E27FC236}">
+                <a16:creationId xmlns:a16="http://schemas.microsoft.com/office/drawing/2014/main" id="{0160DC1D-D755-4648-8F80-7076369D8685}"/>
+              </a:ext>
+            </a:extLst>
+          </p:cNvPr>
+          <p:cNvSpPr txBox="1"/>
+          <p:nvPr/>
+        </p:nvSpPr>
+        <p:spPr>
+          <a:xfrm>
+            <a:off x="3733971" y="5816254"/>
+            <a:ext cx="1622560" cy="369332"/>
+          </a:xfrm>
+          <a:prstGeom prst="rect">
+            <a:avLst/>
+          </a:prstGeom>
+          <a:noFill/>
+        </p:spPr>
+        <p:txBody>
+          <a:bodyPr wrap="none" rtlCol="0">
+            <a:spAutoFit/>
+          </a:bodyPr>
+          <a:lstStyle/>
+          <a:p>
+            <a:r>
+              <a:rPr lang="en-US" dirty="0"/>
+              <a:t>Linear Business</a:t>
+            </a:r>
+          </a:p>
+        </p:txBody>
+      </p:sp>
+      <p:sp>
+        <p:nvSpPr>
+          <p:cNvPr id="65" name="TextBox 64">
+            <a:extLst>
+              <a:ext uri="{FF2B5EF4-FFF2-40B4-BE49-F238E27FC236}">
+                <a16:creationId xmlns:a16="http://schemas.microsoft.com/office/drawing/2014/main" id="{AB0DD0FB-F0A0-2B4C-A4B3-2B2CF0DA8BFE}"/>
+              </a:ext>
+            </a:extLst>
+          </p:cNvPr>
+          <p:cNvSpPr txBox="1"/>
+          <p:nvPr/>
+        </p:nvSpPr>
+        <p:spPr>
+          <a:xfrm>
+            <a:off x="6379592" y="5816254"/>
+            <a:ext cx="1852815" cy="369332"/>
+          </a:xfrm>
+          <a:prstGeom prst="rect">
+            <a:avLst/>
+          </a:prstGeom>
+          <a:noFill/>
+        </p:spPr>
+        <p:txBody>
+          <a:bodyPr wrap="none" rtlCol="0">
+            <a:spAutoFit/>
+          </a:bodyPr>
+          <a:lstStyle/>
+          <a:p>
+            <a:r>
+              <a:rPr lang="en-US" dirty="0"/>
+              <a:t>Platform Business</a:t>
+            </a:r>
+          </a:p>
+        </p:txBody>
+      </p:sp>
+      <p:sp>
+        <p:nvSpPr>
+          <p:cNvPr id="26" name="Rectangle 25">
+            <a:extLst>
+              <a:ext uri="{FF2B5EF4-FFF2-40B4-BE49-F238E27FC236}">
+                <a16:creationId xmlns:a16="http://schemas.microsoft.com/office/drawing/2014/main" id="{6798C27B-1DB7-CC4C-AD61-F26CF00DC7CE}"/>
+              </a:ext>
+            </a:extLst>
+          </p:cNvPr>
+          <p:cNvSpPr/>
+          <p:nvPr/>
+        </p:nvSpPr>
+        <p:spPr>
+          <a:xfrm>
+            <a:off x="5291430" y="4043610"/>
+            <a:ext cx="1164432" cy="528637"/>
+          </a:xfrm>
+          <a:prstGeom prst="rect">
+            <a:avLst/>
+          </a:prstGeom>
+        </p:spPr>
+        <p:style>
+          <a:lnRef idx="2">
+            <a:schemeClr val="accent1">
+              <a:shade val="50000"/>
+            </a:schemeClr>
+          </a:lnRef>
+          <a:fillRef idx="1">
+            <a:schemeClr val="accent1"/>
+          </a:fillRef>
+          <a:effectRef idx="0">
+            <a:schemeClr val="accent1"/>
+          </a:effectRef>
+          <a:fontRef idx="minor">
+            <a:schemeClr val="lt1"/>
+          </a:fontRef>
+        </p:style>
+        <p:txBody>
+          <a:bodyPr rtlCol="0" anchor="ctr"/>
+          <a:lstStyle/>
+          <a:p>
+            <a:pPr algn="ctr"/>
+            <a:r>
+              <a:rPr lang="en-US" sz="1400" dirty="0"/>
+              <a:t>Data</a:t>
+            </a:r>
+            <a:endParaRPr lang="en-US" dirty="0"/>
+          </a:p>
+        </p:txBody>
+      </p:sp>
       <p:sp>
         <p:nvSpPr>
           <p:cNvPr id="46" name="U-Turn Arrow 45">
@@ -5672,6 +5833,911 @@
           </a:p>
         </p:txBody>
       </p:sp>
+      <p:sp>
+        <p:nvSpPr>
+          <p:cNvPr id="55" name="TextBox 54">
+            <a:extLst>
+              <a:ext uri="{FF2B5EF4-FFF2-40B4-BE49-F238E27FC236}">
+                <a16:creationId xmlns:a16="http://schemas.microsoft.com/office/drawing/2014/main" id="{F96F4DBD-2BB7-CE41-817F-FF2CD47ED984}"/>
+              </a:ext>
+            </a:extLst>
+          </p:cNvPr>
+          <p:cNvSpPr txBox="1"/>
+          <p:nvPr/>
+        </p:nvSpPr>
+        <p:spPr>
+          <a:xfrm>
+            <a:off x="5619409" y="2640735"/>
+            <a:ext cx="508473" cy="261610"/>
+          </a:xfrm>
+          <a:prstGeom prst="rect">
+            <a:avLst/>
+          </a:prstGeom>
+          <a:noFill/>
+        </p:spPr>
+        <p:txBody>
+          <a:bodyPr wrap="none" rtlCol="0">
+            <a:spAutoFit/>
+          </a:bodyPr>
+          <a:lstStyle/>
+          <a:p>
+            <a:r>
+              <a:rPr lang="en-US" sz="1100" dirty="0">
+                <a:solidFill>
+                  <a:schemeClr val="bg1"/>
+                </a:solidFill>
+              </a:rPr>
+              <a:t>Value</a:t>
+            </a:r>
+          </a:p>
+        </p:txBody>
+      </p:sp>
+    </p:spTree>
+    <p:extLst>
+      <p:ext uri="{BB962C8B-B14F-4D97-AF65-F5344CB8AC3E}">
+        <p14:creationId xmlns:p14="http://schemas.microsoft.com/office/powerpoint/2010/main" val="3464769461"/>
+      </p:ext>
+    </p:extLst>
+  </p:cSld>
+  <p:clrMapOvr>
+    <a:masterClrMapping/>
+  </p:clrMapOvr>
+</p:sld>
+</file>
+
+<file path=ppt/slides/slide4.xml><?xml version="1.0" encoding="utf-8"?>
+<p:sld xmlns:a="http://schemas.openxmlformats.org/drawingml/2006/main" xmlns:r="http://schemas.openxmlformats.org/officeDocument/2006/relationships" xmlns:p="http://schemas.openxmlformats.org/presentationml/2006/main">
+  <p:cSld>
+    <p:spTree>
+      <p:nvGrpSpPr>
+        <p:cNvPr id="1" name=""/>
+        <p:cNvGrpSpPr/>
+        <p:nvPr/>
+      </p:nvGrpSpPr>
+      <p:grpSpPr>
+        <a:xfrm>
+          <a:off x="0" y="0"/>
+          <a:ext cx="0" cy="0"/>
+          <a:chOff x="0" y="0"/>
+          <a:chExt cx="0" cy="0"/>
+        </a:xfrm>
+      </p:grpSpPr>
+      <p:sp>
+        <p:nvSpPr>
+          <p:cNvPr id="18" name="Rectangle 17">
+            <a:extLst>
+              <a:ext uri="{FF2B5EF4-FFF2-40B4-BE49-F238E27FC236}">
+                <a16:creationId xmlns:a16="http://schemas.microsoft.com/office/drawing/2014/main" id="{F1ED6D2E-F634-C949-B97A-02732AD50C02}"/>
+              </a:ext>
+            </a:extLst>
+          </p:cNvPr>
+          <p:cNvSpPr/>
+          <p:nvPr/>
+        </p:nvSpPr>
+        <p:spPr>
+          <a:xfrm>
+            <a:off x="3414942" y="3002408"/>
+            <a:ext cx="5929300" cy="1710930"/>
+          </a:xfrm>
+          <a:prstGeom prst="rect">
+            <a:avLst/>
+          </a:prstGeom>
+          <a:solidFill>
+            <a:schemeClr val="accent1">
+              <a:lumMod val="20000"/>
+              <a:lumOff val="80000"/>
+            </a:schemeClr>
+          </a:solidFill>
+          <a:ln>
+            <a:solidFill>
+              <a:schemeClr val="accent1"/>
+            </a:solidFill>
+          </a:ln>
+        </p:spPr>
+        <p:style>
+          <a:lnRef idx="2">
+            <a:schemeClr val="accent1">
+              <a:shade val="50000"/>
+            </a:schemeClr>
+          </a:lnRef>
+          <a:fillRef idx="1">
+            <a:schemeClr val="accent1"/>
+          </a:fillRef>
+          <a:effectRef idx="0">
+            <a:schemeClr val="accent1"/>
+          </a:effectRef>
+          <a:fontRef idx="minor">
+            <a:schemeClr val="lt1"/>
+          </a:fontRef>
+        </p:style>
+        <p:txBody>
+          <a:bodyPr rtlCol="0" anchor="ctr"/>
+          <a:lstStyle/>
+          <a:p>
+            <a:pPr algn="ctr"/>
+            <a:r>
+              <a:rPr lang="en-US" dirty="0">
+                <a:solidFill>
+                  <a:schemeClr val="accent1"/>
+                </a:solidFill>
+              </a:rPr>
+              <a:t>                                                        </a:t>
+            </a:r>
+          </a:p>
+          <a:p>
+            <a:pPr algn="ctr"/>
+            <a:endParaRPr lang="en-US" dirty="0">
+              <a:solidFill>
+                <a:schemeClr val="accent1"/>
+              </a:solidFill>
+            </a:endParaRPr>
+          </a:p>
+          <a:p>
+            <a:pPr algn="ctr"/>
+            <a:endParaRPr lang="en-US" dirty="0">
+              <a:solidFill>
+                <a:schemeClr val="accent1"/>
+              </a:solidFill>
+            </a:endParaRPr>
+          </a:p>
+          <a:p>
+            <a:pPr algn="ctr"/>
+            <a:r>
+              <a:rPr lang="en-US" dirty="0">
+                <a:solidFill>
+                  <a:schemeClr val="accent1"/>
+                </a:solidFill>
+              </a:rPr>
+              <a:t>                                                       Organization</a:t>
+            </a:r>
+          </a:p>
+        </p:txBody>
+      </p:sp>
+      <p:sp>
+        <p:nvSpPr>
+          <p:cNvPr id="19" name="Rectangle 18">
+            <a:extLst>
+              <a:ext uri="{FF2B5EF4-FFF2-40B4-BE49-F238E27FC236}">
+                <a16:creationId xmlns:a16="http://schemas.microsoft.com/office/drawing/2014/main" id="{0A990297-F9DF-A44A-B4E5-1AC12AFAA46F}"/>
+              </a:ext>
+            </a:extLst>
+          </p:cNvPr>
+          <p:cNvSpPr/>
+          <p:nvPr/>
+        </p:nvSpPr>
+        <p:spPr>
+          <a:xfrm>
+            <a:off x="3543520" y="3120279"/>
+            <a:ext cx="5686421" cy="771525"/>
+          </a:xfrm>
+          <a:prstGeom prst="rect">
+            <a:avLst/>
+          </a:prstGeom>
+          <a:solidFill>
+            <a:schemeClr val="accent1">
+              <a:lumMod val="20000"/>
+              <a:lumOff val="80000"/>
+            </a:schemeClr>
+          </a:solidFill>
+          <a:ln>
+            <a:solidFill>
+              <a:schemeClr val="accent1"/>
+            </a:solidFill>
+            <a:prstDash val="sysDot"/>
+          </a:ln>
+        </p:spPr>
+        <p:style>
+          <a:lnRef idx="2">
+            <a:schemeClr val="accent1">
+              <a:shade val="50000"/>
+            </a:schemeClr>
+          </a:lnRef>
+          <a:fillRef idx="1">
+            <a:schemeClr val="accent1"/>
+          </a:fillRef>
+          <a:effectRef idx="0">
+            <a:schemeClr val="accent1"/>
+          </a:effectRef>
+          <a:fontRef idx="minor">
+            <a:schemeClr val="lt1"/>
+          </a:fontRef>
+        </p:style>
+        <p:txBody>
+          <a:bodyPr rtlCol="0" anchor="ctr"/>
+          <a:lstStyle/>
+          <a:p>
+            <a:pPr algn="ctr"/>
+            <a:r>
+              <a:rPr lang="en-US" dirty="0">
+                <a:solidFill>
+                  <a:schemeClr val="accent1"/>
+                </a:solidFill>
+              </a:rPr>
+              <a:t>                                                                                     </a:t>
+            </a:r>
+            <a:r>
+              <a:rPr lang="en-US" sz="1400" dirty="0">
+                <a:solidFill>
+                  <a:schemeClr val="accent1"/>
+                </a:solidFill>
+              </a:rPr>
+              <a:t>Means of</a:t>
+            </a:r>
+          </a:p>
+          <a:p>
+            <a:pPr algn="ctr"/>
+            <a:r>
+              <a:rPr lang="en-US" sz="1400" dirty="0">
+                <a:solidFill>
+                  <a:schemeClr val="accent1"/>
+                </a:solidFill>
+              </a:rPr>
+              <a:t>                                                                                                                Connection</a:t>
+            </a:r>
+          </a:p>
+        </p:txBody>
+      </p:sp>
+      <p:sp>
+        <p:nvSpPr>
+          <p:cNvPr id="27" name="Rectangle 26">
+            <a:extLst>
+              <a:ext uri="{FF2B5EF4-FFF2-40B4-BE49-F238E27FC236}">
+                <a16:creationId xmlns:a16="http://schemas.microsoft.com/office/drawing/2014/main" id="{F64D452D-B791-944E-BCE5-18637DD1AD2A}"/>
+              </a:ext>
+            </a:extLst>
+          </p:cNvPr>
+          <p:cNvSpPr/>
+          <p:nvPr/>
+        </p:nvSpPr>
+        <p:spPr>
+          <a:xfrm>
+            <a:off x="3414942" y="4809775"/>
+            <a:ext cx="5929300" cy="807247"/>
+          </a:xfrm>
+          <a:prstGeom prst="rect">
+            <a:avLst/>
+          </a:prstGeom>
+          <a:solidFill>
+            <a:schemeClr val="accent1">
+              <a:lumMod val="20000"/>
+              <a:lumOff val="80000"/>
+            </a:schemeClr>
+          </a:solidFill>
+          <a:ln>
+            <a:solidFill>
+              <a:schemeClr val="accent1"/>
+            </a:solidFill>
+            <a:prstDash val="sysDot"/>
+          </a:ln>
+        </p:spPr>
+        <p:style>
+          <a:lnRef idx="2">
+            <a:schemeClr val="accent1">
+              <a:shade val="50000"/>
+            </a:schemeClr>
+          </a:lnRef>
+          <a:fillRef idx="1">
+            <a:schemeClr val="accent1"/>
+          </a:fillRef>
+          <a:effectRef idx="0">
+            <a:schemeClr val="accent1"/>
+          </a:effectRef>
+          <a:fontRef idx="minor">
+            <a:schemeClr val="lt1"/>
+          </a:fontRef>
+        </p:style>
+        <p:txBody>
+          <a:bodyPr rtlCol="0" anchor="ctr"/>
+          <a:lstStyle/>
+          <a:p>
+            <a:pPr algn="ctr"/>
+            <a:r>
+              <a:rPr lang="en-US" dirty="0">
+                <a:solidFill>
+                  <a:schemeClr val="accent1"/>
+                </a:solidFill>
+              </a:rPr>
+              <a:t>                                                                                     </a:t>
+            </a:r>
+            <a:r>
+              <a:rPr lang="en-US" sz="1400" dirty="0">
+                <a:solidFill>
+                  <a:schemeClr val="accent1"/>
+                </a:solidFill>
+              </a:rPr>
+              <a:t>Means of</a:t>
+            </a:r>
+          </a:p>
+          <a:p>
+            <a:pPr algn="ctr"/>
+            <a:r>
+              <a:rPr lang="en-US" sz="1400" dirty="0">
+                <a:solidFill>
+                  <a:schemeClr val="accent1"/>
+                </a:solidFill>
+              </a:rPr>
+              <a:t>                                                                                                                Production</a:t>
+            </a:r>
+          </a:p>
+        </p:txBody>
+      </p:sp>
+      <p:pic>
+        <p:nvPicPr>
+          <p:cNvPr id="5" name="Graphic 4" descr="Group">
+            <a:extLst>
+              <a:ext uri="{FF2B5EF4-FFF2-40B4-BE49-F238E27FC236}">
+                <a16:creationId xmlns:a16="http://schemas.microsoft.com/office/drawing/2014/main" id="{9AC8F8F3-6EB5-B343-8D1B-EFF464983A45}"/>
+              </a:ext>
+            </a:extLst>
+          </p:cNvPr>
+          <p:cNvPicPr>
+            <a:picLocks noChangeAspect="1"/>
+          </p:cNvPicPr>
+          <p:nvPr/>
+        </p:nvPicPr>
+        <p:blipFill>
+          <a:blip r:embed="rId2">
+            <a:extLst>
+              <a:ext uri="{96DAC541-7B7A-43D3-8B79-37D633B846F1}">
+                <asvg:svgBlip xmlns:asvg="http://schemas.microsoft.com/office/drawing/2016/SVG/main" r:embed="rId3"/>
+              </a:ext>
+            </a:extLst>
+          </a:blip>
+          <a:stretch>
+            <a:fillRect/>
+          </a:stretch>
+        </p:blipFill>
+        <p:spPr>
+          <a:xfrm>
+            <a:off x="3827481" y="1908112"/>
+            <a:ext cx="914400" cy="914400"/>
+          </a:xfrm>
+          <a:prstGeom prst="rect">
+            <a:avLst/>
+          </a:prstGeom>
+        </p:spPr>
+      </p:pic>
+      <p:sp>
+        <p:nvSpPr>
+          <p:cNvPr id="7" name="Rectangle 6">
+            <a:extLst>
+              <a:ext uri="{FF2B5EF4-FFF2-40B4-BE49-F238E27FC236}">
+                <a16:creationId xmlns:a16="http://schemas.microsoft.com/office/drawing/2014/main" id="{F800F307-EAC2-6D44-B84A-4E63CF4892D3}"/>
+              </a:ext>
+            </a:extLst>
+          </p:cNvPr>
+          <p:cNvSpPr/>
+          <p:nvPr/>
+        </p:nvSpPr>
+        <p:spPr>
+          <a:xfrm>
+            <a:off x="3706634" y="4043610"/>
+            <a:ext cx="1164432" cy="528637"/>
+          </a:xfrm>
+          <a:prstGeom prst="rect">
+            <a:avLst/>
+          </a:prstGeom>
+        </p:spPr>
+        <p:style>
+          <a:lnRef idx="2">
+            <a:schemeClr val="accent1">
+              <a:shade val="50000"/>
+            </a:schemeClr>
+          </a:lnRef>
+          <a:fillRef idx="1">
+            <a:schemeClr val="accent1"/>
+          </a:fillRef>
+          <a:effectRef idx="0">
+            <a:schemeClr val="accent1"/>
+          </a:effectRef>
+          <a:fontRef idx="minor">
+            <a:schemeClr val="lt1"/>
+          </a:fontRef>
+        </p:style>
+        <p:txBody>
+          <a:bodyPr rtlCol="0" anchor="ctr"/>
+          <a:lstStyle/>
+          <a:p>
+            <a:pPr algn="ctr"/>
+            <a:r>
+              <a:rPr lang="en-US" sz="1400" dirty="0"/>
+              <a:t>Products</a:t>
+            </a:r>
+            <a:endParaRPr lang="en-US" dirty="0"/>
+          </a:p>
+        </p:txBody>
+      </p:sp>
+      <p:cxnSp>
+        <p:nvCxnSpPr>
+          <p:cNvPr id="13" name="Straight Arrow Connector 12">
+            <a:extLst>
+              <a:ext uri="{FF2B5EF4-FFF2-40B4-BE49-F238E27FC236}">
+                <a16:creationId xmlns:a16="http://schemas.microsoft.com/office/drawing/2014/main" id="{2ECFF7D6-EF74-2849-9128-3ECB0B91F497}"/>
+              </a:ext>
+            </a:extLst>
+          </p:cNvPr>
+          <p:cNvCxnSpPr>
+            <a:cxnSpLocks/>
+            <a:stCxn id="7" idx="0"/>
+            <a:endCxn id="20" idx="2"/>
+          </p:cNvCxnSpPr>
+          <p:nvPr/>
+        </p:nvCxnSpPr>
+        <p:spPr>
+          <a:xfrm flipH="1" flipV="1">
+            <a:off x="4284682" y="3791790"/>
+            <a:ext cx="4168" cy="251820"/>
+          </a:xfrm>
+          <a:prstGeom prst="straightConnector1">
+            <a:avLst/>
+          </a:prstGeom>
+          <a:ln w="38100">
+            <a:tailEnd type="triangle"/>
+          </a:ln>
+        </p:spPr>
+        <p:style>
+          <a:lnRef idx="1">
+            <a:schemeClr val="accent1"/>
+          </a:lnRef>
+          <a:fillRef idx="0">
+            <a:schemeClr val="accent1"/>
+          </a:fillRef>
+          <a:effectRef idx="0">
+            <a:schemeClr val="accent1"/>
+          </a:effectRef>
+          <a:fontRef idx="minor">
+            <a:schemeClr val="tx1"/>
+          </a:fontRef>
+        </p:style>
+      </p:cxnSp>
+      <p:cxnSp>
+        <p:nvCxnSpPr>
+          <p:cNvPr id="16" name="Straight Arrow Connector 15">
+            <a:extLst>
+              <a:ext uri="{FF2B5EF4-FFF2-40B4-BE49-F238E27FC236}">
+                <a16:creationId xmlns:a16="http://schemas.microsoft.com/office/drawing/2014/main" id="{32FC9F45-5FBD-F14C-BD91-16E437A3ECC9}"/>
+              </a:ext>
+            </a:extLst>
+          </p:cNvPr>
+          <p:cNvCxnSpPr>
+            <a:cxnSpLocks/>
+            <a:stCxn id="20" idx="0"/>
+            <a:endCxn id="5" idx="2"/>
+          </p:cNvCxnSpPr>
+          <p:nvPr/>
+        </p:nvCxnSpPr>
+        <p:spPr>
+          <a:xfrm flipH="1" flipV="1">
+            <a:off x="4284681" y="2822512"/>
+            <a:ext cx="1" cy="440641"/>
+          </a:xfrm>
+          <a:prstGeom prst="straightConnector1">
+            <a:avLst/>
+          </a:prstGeom>
+          <a:ln w="38100">
+            <a:tailEnd type="triangle"/>
+          </a:ln>
+        </p:spPr>
+        <p:style>
+          <a:lnRef idx="1">
+            <a:schemeClr val="accent1"/>
+          </a:lnRef>
+          <a:fillRef idx="0">
+            <a:schemeClr val="accent1"/>
+          </a:fillRef>
+          <a:effectRef idx="0">
+            <a:schemeClr val="accent1"/>
+          </a:effectRef>
+          <a:fontRef idx="minor">
+            <a:schemeClr val="tx1"/>
+          </a:fontRef>
+        </p:style>
+      </p:cxnSp>
+      <p:sp>
+        <p:nvSpPr>
+          <p:cNvPr id="22" name="Rectangle 21">
+            <a:extLst>
+              <a:ext uri="{FF2B5EF4-FFF2-40B4-BE49-F238E27FC236}">
+                <a16:creationId xmlns:a16="http://schemas.microsoft.com/office/drawing/2014/main" id="{469A8BA3-CB0E-5D44-A8BE-CFE43A4A3EFA}"/>
+              </a:ext>
+            </a:extLst>
+          </p:cNvPr>
+          <p:cNvSpPr/>
+          <p:nvPr/>
+        </p:nvSpPr>
+        <p:spPr>
+          <a:xfrm>
+            <a:off x="3706634" y="4950866"/>
+            <a:ext cx="1164432" cy="528637"/>
+          </a:xfrm>
+          <a:prstGeom prst="rect">
+            <a:avLst/>
+          </a:prstGeom>
+        </p:spPr>
+        <p:style>
+          <a:lnRef idx="2">
+            <a:schemeClr val="accent1">
+              <a:shade val="50000"/>
+            </a:schemeClr>
+          </a:lnRef>
+          <a:fillRef idx="1">
+            <a:schemeClr val="accent1"/>
+          </a:fillRef>
+          <a:effectRef idx="0">
+            <a:schemeClr val="accent1"/>
+          </a:effectRef>
+          <a:fontRef idx="minor">
+            <a:schemeClr val="lt1"/>
+          </a:fontRef>
+        </p:style>
+        <p:txBody>
+          <a:bodyPr rtlCol="0" anchor="ctr"/>
+          <a:lstStyle/>
+          <a:p>
+            <a:pPr algn="ctr"/>
+            <a:r>
+              <a:rPr lang="en-US" sz="1400" dirty="0"/>
+              <a:t>Ingredients</a:t>
+            </a:r>
+            <a:endParaRPr lang="en-US" sz="2400" dirty="0"/>
+          </a:p>
+        </p:txBody>
+      </p:sp>
+      <p:cxnSp>
+        <p:nvCxnSpPr>
+          <p:cNvPr id="24" name="Straight Arrow Connector 23">
+            <a:extLst>
+              <a:ext uri="{FF2B5EF4-FFF2-40B4-BE49-F238E27FC236}">
+                <a16:creationId xmlns:a16="http://schemas.microsoft.com/office/drawing/2014/main" id="{4E99AC50-BE01-DD4B-BD69-9C7843AAB406}"/>
+              </a:ext>
+            </a:extLst>
+          </p:cNvPr>
+          <p:cNvCxnSpPr>
+            <a:cxnSpLocks/>
+            <a:stCxn id="22" idx="0"/>
+            <a:endCxn id="7" idx="2"/>
+          </p:cNvCxnSpPr>
+          <p:nvPr/>
+        </p:nvCxnSpPr>
+        <p:spPr>
+          <a:xfrm flipV="1">
+            <a:off x="4288850" y="4572247"/>
+            <a:ext cx="0" cy="378619"/>
+          </a:xfrm>
+          <a:prstGeom prst="straightConnector1">
+            <a:avLst/>
+          </a:prstGeom>
+          <a:ln w="38100">
+            <a:tailEnd type="triangle"/>
+          </a:ln>
+        </p:spPr>
+        <p:style>
+          <a:lnRef idx="1">
+            <a:schemeClr val="accent1"/>
+          </a:lnRef>
+          <a:fillRef idx="0">
+            <a:schemeClr val="accent1"/>
+          </a:fillRef>
+          <a:effectRef idx="0">
+            <a:schemeClr val="accent1"/>
+          </a:effectRef>
+          <a:fontRef idx="minor">
+            <a:schemeClr val="tx1"/>
+          </a:fontRef>
+        </p:style>
+      </p:cxnSp>
+      <p:sp>
+        <p:nvSpPr>
+          <p:cNvPr id="20" name="Rectangle 19">
+            <a:extLst>
+              <a:ext uri="{FF2B5EF4-FFF2-40B4-BE49-F238E27FC236}">
+                <a16:creationId xmlns:a16="http://schemas.microsoft.com/office/drawing/2014/main" id="{210D6725-69BB-854C-816C-B0399C4C47AC}"/>
+              </a:ext>
+            </a:extLst>
+          </p:cNvPr>
+          <p:cNvSpPr/>
+          <p:nvPr/>
+        </p:nvSpPr>
+        <p:spPr>
+          <a:xfrm>
+            <a:off x="3698298" y="3263153"/>
+            <a:ext cx="1172767" cy="528637"/>
+          </a:xfrm>
+          <a:prstGeom prst="rect">
+            <a:avLst/>
+          </a:prstGeom>
+        </p:spPr>
+        <p:style>
+          <a:lnRef idx="2">
+            <a:schemeClr val="accent1">
+              <a:shade val="50000"/>
+            </a:schemeClr>
+          </a:lnRef>
+          <a:fillRef idx="1">
+            <a:schemeClr val="accent1"/>
+          </a:fillRef>
+          <a:effectRef idx="0">
+            <a:schemeClr val="accent1"/>
+          </a:effectRef>
+          <a:fontRef idx="minor">
+            <a:schemeClr val="lt1"/>
+          </a:fontRef>
+        </p:style>
+        <p:txBody>
+          <a:bodyPr rtlCol="0" anchor="ctr"/>
+          <a:lstStyle/>
+          <a:p>
+            <a:pPr algn="ctr"/>
+            <a:r>
+              <a:rPr lang="en-US" sz="1400" dirty="0"/>
+              <a:t>Services</a:t>
+            </a:r>
+            <a:endParaRPr lang="en-US" dirty="0"/>
+          </a:p>
+        </p:txBody>
+      </p:sp>
+      <p:cxnSp>
+        <p:nvCxnSpPr>
+          <p:cNvPr id="23" name="Straight Arrow Connector 22">
+            <a:extLst>
+              <a:ext uri="{FF2B5EF4-FFF2-40B4-BE49-F238E27FC236}">
+                <a16:creationId xmlns:a16="http://schemas.microsoft.com/office/drawing/2014/main" id="{DC9C902F-23AC-5F42-9464-EF4C5ED872AD}"/>
+              </a:ext>
+            </a:extLst>
+          </p:cNvPr>
+          <p:cNvCxnSpPr>
+            <a:cxnSpLocks/>
+            <a:stCxn id="26" idx="1"/>
+          </p:cNvCxnSpPr>
+          <p:nvPr/>
+        </p:nvCxnSpPr>
+        <p:spPr>
+          <a:xfrm flipH="1">
+            <a:off x="4871065" y="4307929"/>
+            <a:ext cx="420365" cy="0"/>
+          </a:xfrm>
+          <a:prstGeom prst="straightConnector1">
+            <a:avLst/>
+          </a:prstGeom>
+          <a:ln w="38100">
+            <a:tailEnd type="triangle"/>
+          </a:ln>
+        </p:spPr>
+        <p:style>
+          <a:lnRef idx="1">
+            <a:schemeClr val="accent1"/>
+          </a:lnRef>
+          <a:fillRef idx="0">
+            <a:schemeClr val="accent1"/>
+          </a:fillRef>
+          <a:effectRef idx="0">
+            <a:schemeClr val="accent1"/>
+          </a:effectRef>
+          <a:fontRef idx="minor">
+            <a:schemeClr val="tx1"/>
+          </a:fontRef>
+        </p:style>
+      </p:cxnSp>
+      <p:cxnSp>
+        <p:nvCxnSpPr>
+          <p:cNvPr id="25" name="Straight Arrow Connector 24">
+            <a:extLst>
+              <a:ext uri="{FF2B5EF4-FFF2-40B4-BE49-F238E27FC236}">
+                <a16:creationId xmlns:a16="http://schemas.microsoft.com/office/drawing/2014/main" id="{0B6D07C2-C381-0A49-BD90-80BA053AC94C}"/>
+              </a:ext>
+            </a:extLst>
+          </p:cNvPr>
+          <p:cNvCxnSpPr>
+            <a:cxnSpLocks/>
+            <a:stCxn id="45" idx="2"/>
+            <a:endCxn id="28" idx="0"/>
+          </p:cNvCxnSpPr>
+          <p:nvPr/>
+        </p:nvCxnSpPr>
+        <p:spPr>
+          <a:xfrm>
+            <a:off x="7276666" y="2822512"/>
+            <a:ext cx="0" cy="440641"/>
+          </a:xfrm>
+          <a:prstGeom prst="straightConnector1">
+            <a:avLst/>
+          </a:prstGeom>
+          <a:ln w="38100">
+            <a:tailEnd type="triangle"/>
+          </a:ln>
+        </p:spPr>
+        <p:style>
+          <a:lnRef idx="1">
+            <a:schemeClr val="accent1"/>
+          </a:lnRef>
+          <a:fillRef idx="0">
+            <a:schemeClr val="accent1"/>
+          </a:fillRef>
+          <a:effectRef idx="0">
+            <a:schemeClr val="accent1"/>
+          </a:effectRef>
+          <a:fontRef idx="minor">
+            <a:schemeClr val="tx1"/>
+          </a:fontRef>
+        </p:style>
+      </p:cxnSp>
+      <p:sp>
+        <p:nvSpPr>
+          <p:cNvPr id="26" name="Rectangle 25">
+            <a:extLst>
+              <a:ext uri="{FF2B5EF4-FFF2-40B4-BE49-F238E27FC236}">
+                <a16:creationId xmlns:a16="http://schemas.microsoft.com/office/drawing/2014/main" id="{6798C27B-1DB7-CC4C-AD61-F26CF00DC7CE}"/>
+              </a:ext>
+            </a:extLst>
+          </p:cNvPr>
+          <p:cNvSpPr/>
+          <p:nvPr/>
+        </p:nvSpPr>
+        <p:spPr>
+          <a:xfrm>
+            <a:off x="5291430" y="4043610"/>
+            <a:ext cx="1164432" cy="528637"/>
+          </a:xfrm>
+          <a:prstGeom prst="rect">
+            <a:avLst/>
+          </a:prstGeom>
+        </p:spPr>
+        <p:style>
+          <a:lnRef idx="2">
+            <a:schemeClr val="accent1">
+              <a:shade val="50000"/>
+            </a:schemeClr>
+          </a:lnRef>
+          <a:fillRef idx="1">
+            <a:schemeClr val="accent1"/>
+          </a:fillRef>
+          <a:effectRef idx="0">
+            <a:schemeClr val="accent1"/>
+          </a:effectRef>
+          <a:fontRef idx="minor">
+            <a:schemeClr val="lt1"/>
+          </a:fontRef>
+        </p:style>
+        <p:txBody>
+          <a:bodyPr rtlCol="0" anchor="ctr"/>
+          <a:lstStyle/>
+          <a:p>
+            <a:pPr algn="ctr"/>
+            <a:r>
+              <a:rPr lang="en-US" sz="1400" dirty="0"/>
+              <a:t>Data</a:t>
+            </a:r>
+            <a:endParaRPr lang="en-US" dirty="0"/>
+          </a:p>
+        </p:txBody>
+      </p:sp>
+      <p:sp>
+        <p:nvSpPr>
+          <p:cNvPr id="28" name="Rectangle 27">
+            <a:extLst>
+              <a:ext uri="{FF2B5EF4-FFF2-40B4-BE49-F238E27FC236}">
+                <a16:creationId xmlns:a16="http://schemas.microsoft.com/office/drawing/2014/main" id="{35D55A4B-E4E0-0144-ABEA-5BAA5E3D989F}"/>
+              </a:ext>
+            </a:extLst>
+          </p:cNvPr>
+          <p:cNvSpPr/>
+          <p:nvPr/>
+        </p:nvSpPr>
+        <p:spPr>
+          <a:xfrm>
+            <a:off x="6694450" y="3263153"/>
+            <a:ext cx="1164432" cy="528637"/>
+          </a:xfrm>
+          <a:prstGeom prst="rect">
+            <a:avLst/>
+          </a:prstGeom>
+        </p:spPr>
+        <p:style>
+          <a:lnRef idx="2">
+            <a:schemeClr val="accent1">
+              <a:shade val="50000"/>
+            </a:schemeClr>
+          </a:lnRef>
+          <a:fillRef idx="1">
+            <a:schemeClr val="accent1"/>
+          </a:fillRef>
+          <a:effectRef idx="0">
+            <a:schemeClr val="accent1"/>
+          </a:effectRef>
+          <a:fontRef idx="minor">
+            <a:schemeClr val="lt1"/>
+          </a:fontRef>
+        </p:style>
+        <p:txBody>
+          <a:bodyPr rtlCol="0" anchor="ctr"/>
+          <a:lstStyle/>
+          <a:p>
+            <a:pPr algn="ctr"/>
+            <a:r>
+              <a:rPr lang="en-US" sz="1400" dirty="0"/>
+              <a:t>Services</a:t>
+            </a:r>
+            <a:endParaRPr lang="en-US" dirty="0"/>
+          </a:p>
+        </p:txBody>
+      </p:sp>
+      <p:cxnSp>
+        <p:nvCxnSpPr>
+          <p:cNvPr id="38" name="Straight Arrow Connector 37">
+            <a:extLst>
+              <a:ext uri="{FF2B5EF4-FFF2-40B4-BE49-F238E27FC236}">
+                <a16:creationId xmlns:a16="http://schemas.microsoft.com/office/drawing/2014/main" id="{544296A1-628F-264F-AC43-E6FB4ADFBF1D}"/>
+              </a:ext>
+            </a:extLst>
+          </p:cNvPr>
+          <p:cNvCxnSpPr>
+            <a:cxnSpLocks/>
+          </p:cNvCxnSpPr>
+          <p:nvPr/>
+        </p:nvCxnSpPr>
+        <p:spPr>
+          <a:xfrm flipH="1" flipV="1">
+            <a:off x="4871067" y="3493535"/>
+            <a:ext cx="420362" cy="714380"/>
+          </a:xfrm>
+          <a:prstGeom prst="straightConnector1">
+            <a:avLst/>
+          </a:prstGeom>
+          <a:ln w="38100">
+            <a:tailEnd type="triangle"/>
+          </a:ln>
+        </p:spPr>
+        <p:style>
+          <a:lnRef idx="1">
+            <a:schemeClr val="accent1"/>
+          </a:lnRef>
+          <a:fillRef idx="0">
+            <a:schemeClr val="accent1"/>
+          </a:fillRef>
+          <a:effectRef idx="0">
+            <a:schemeClr val="accent1"/>
+          </a:effectRef>
+          <a:fontRef idx="minor">
+            <a:schemeClr val="tx1"/>
+          </a:fontRef>
+        </p:style>
+      </p:cxnSp>
+      <p:pic>
+        <p:nvPicPr>
+          <p:cNvPr id="45" name="Graphic 44" descr="Group">
+            <a:extLst>
+              <a:ext uri="{FF2B5EF4-FFF2-40B4-BE49-F238E27FC236}">
+                <a16:creationId xmlns:a16="http://schemas.microsoft.com/office/drawing/2014/main" id="{907E253C-9121-534F-A5DC-F6DD02679780}"/>
+              </a:ext>
+            </a:extLst>
+          </p:cNvPr>
+          <p:cNvPicPr>
+            <a:picLocks noChangeAspect="1"/>
+          </p:cNvPicPr>
+          <p:nvPr/>
+        </p:nvPicPr>
+        <p:blipFill>
+          <a:blip r:embed="rId2">
+            <a:extLst>
+              <a:ext uri="{96DAC541-7B7A-43D3-8B79-37D633B846F1}">
+                <asvg:svgBlip xmlns:asvg="http://schemas.microsoft.com/office/drawing/2016/SVG/main" r:embed="rId3"/>
+              </a:ext>
+            </a:extLst>
+          </a:blip>
+          <a:stretch>
+            <a:fillRect/>
+          </a:stretch>
+        </p:blipFill>
+        <p:spPr>
+          <a:xfrm>
+            <a:off x="6819466" y="1908112"/>
+            <a:ext cx="914400" cy="914400"/>
+          </a:xfrm>
+          <a:prstGeom prst="rect">
+            <a:avLst/>
+          </a:prstGeom>
+        </p:spPr>
+      </p:pic>
       <p:cxnSp>
         <p:nvCxnSpPr>
           <p:cNvPr id="49" name="Straight Arrow Connector 48">
@@ -5757,7 +6823,7 @@
     </p:spTree>
     <p:extLst>
       <p:ext uri="{BB962C8B-B14F-4D97-AF65-F5344CB8AC3E}">
-        <p14:creationId xmlns:p14="http://schemas.microsoft.com/office/powerpoint/2010/main" val="3464769461"/>
+        <p14:creationId xmlns:p14="http://schemas.microsoft.com/office/powerpoint/2010/main" val="3723008217"/>
       </p:ext>
     </p:extLst>
   </p:cSld>

</xml_diff>